<commit_message>
update config file and remove some unused variables from predictions.py
</commit_message>
<xml_diff>
--- a/Final Project.pptx
+++ b/Final Project.pptx
@@ -24,6 +24,10 @@
     <p:sldId id="274" r:id="rId18"/>
     <p:sldId id="275" r:id="rId19"/>
     <p:sldId id="277" r:id="rId20"/>
+    <p:sldId id="280" r:id="rId21"/>
+    <p:sldId id="281" r:id="rId22"/>
+    <p:sldId id="282" r:id="rId23"/>
+    <p:sldId id="283" r:id="rId24"/>
   </p:sldIdLst>
   <p:sldSz cx="12192000" cy="6858000"/>
   <p:notesSz cx="6858000" cy="9144000"/>
@@ -8041,7 +8045,7 @@
           <a:p>
             <a:fld id="{9184DA70-C731-4C70-880D-CCD4705E623C}" type="datetime1">
               <a:rPr lang="en-US" smtClean="0"/>
-              <a:t>3/24/2021</a:t>
+              <a:t>3/25/2021</a:t>
             </a:fld>
             <a:endParaRPr lang="en-US" dirty="0"/>
           </a:p>
@@ -8229,7 +8233,7 @@
           <a:p>
             <a:fld id="{B612A279-0833-481D-8C56-F67FD0AC6C50}" type="datetime1">
               <a:rPr lang="en-US" smtClean="0"/>
-              <a:t>3/24/2021</a:t>
+              <a:t>3/25/2021</a:t>
             </a:fld>
             <a:endParaRPr lang="en-US" dirty="0"/>
           </a:p>
@@ -8471,7 +8475,7 @@
           <a:p>
             <a:fld id="{6587DA83-5663-4C9C-B9AA-0B40A3DAFF81}" type="datetime1">
               <a:rPr lang="en-US" smtClean="0"/>
-              <a:t>3/24/2021</a:t>
+              <a:t>3/25/2021</a:t>
             </a:fld>
             <a:endParaRPr lang="en-US" dirty="0"/>
           </a:p>
@@ -8659,7 +8663,7 @@
           <a:p>
             <a:fld id="{4BE1D723-8F53-4F53-90B0-1982A396982E}" type="datetime1">
               <a:rPr lang="en-US" smtClean="0"/>
-              <a:t>3/24/2021</a:t>
+              <a:t>3/25/2021</a:t>
             </a:fld>
             <a:endParaRPr lang="en-US" dirty="0"/>
           </a:p>
@@ -9032,7 +9036,7 @@
           <a:p>
             <a:fld id="{97669AF7-7BEB-44E4-9852-375E34362B5B}" type="datetime1">
               <a:rPr lang="en-US" smtClean="0"/>
-              <a:t>3/24/2021</a:t>
+              <a:t>3/25/2021</a:t>
             </a:fld>
             <a:endParaRPr lang="en-US" dirty="0"/>
           </a:p>
@@ -9287,7 +9291,7 @@
           <a:p>
             <a:fld id="{BAAAC38D-0552-4C82-B593-E6124DFADBE2}" type="datetime1">
               <a:rPr lang="en-US" smtClean="0"/>
-              <a:t>3/24/2021</a:t>
+              <a:t>3/25/2021</a:t>
             </a:fld>
             <a:endParaRPr lang="en-US" dirty="0"/>
           </a:p>
@@ -9684,7 +9688,7 @@
           <a:p>
             <a:fld id="{D9DF0F1C-5577-4ACB-BB62-DF8F3C494C7E}" type="datetime1">
               <a:rPr lang="en-US" smtClean="0"/>
-              <a:t>3/24/2021</a:t>
+              <a:t>3/25/2021</a:t>
             </a:fld>
             <a:endParaRPr lang="en-US" dirty="0"/>
           </a:p>
@@ -9820,7 +9824,7 @@
           <a:p>
             <a:fld id="{1775B394-D9F9-4F0C-B15D-605F45CB9E9F}" type="datetime1">
               <a:rPr lang="en-US" smtClean="0"/>
-              <a:t>3/24/2021</a:t>
+              <a:t>3/25/2021</a:t>
             </a:fld>
             <a:endParaRPr lang="en-US" dirty="0"/>
           </a:p>
@@ -9977,7 +9981,7 @@
           <a:p>
             <a:fld id="{39667345-2558-425A-8533-9BFDBCE15005}" type="datetime1">
               <a:rPr lang="en-US" smtClean="0"/>
-              <a:t>3/24/2021</a:t>
+              <a:t>3/25/2021</a:t>
             </a:fld>
             <a:endParaRPr lang="en-US" dirty="0"/>
           </a:p>
@@ -10306,7 +10310,7 @@
           <a:p>
             <a:fld id="{92BEA474-078D-4E9B-9B14-09A87B19DC46}" type="datetime1">
               <a:rPr lang="en-US" smtClean="0"/>
-              <a:t>3/24/2021</a:t>
+              <a:t>3/25/2021</a:t>
             </a:fld>
             <a:endParaRPr lang="en-US" dirty="0"/>
           </a:p>
@@ -10656,7 +10660,7 @@
           <a:p>
             <a:fld id="{4907D986-8816-4272-A432-0437A28A9828}" type="datetime1">
               <a:rPr lang="en-US" smtClean="0"/>
-              <a:t>3/24/2021</a:t>
+              <a:t>3/25/2021</a:t>
             </a:fld>
             <a:endParaRPr lang="en-US" dirty="0"/>
           </a:p>
@@ -10917,7 +10921,7 @@
           <a:p>
             <a:fld id="{62D6E202-B606-4609-B914-27C9371A1F6D}" type="datetime1">
               <a:rPr lang="en-US" smtClean="0"/>
-              <a:t>3/24/2021</a:t>
+              <a:t>3/25/2021</a:t>
             </a:fld>
             <a:endParaRPr lang="en-US" dirty="0"/>
           </a:p>
@@ -11795,7 +11799,7 @@
           <a:p>
             <a:r>
               <a:rPr lang="en-US" sz="2400" dirty="0"/>
-              <a:t>Market performance = +14.7</a:t>
+              <a:t>Market performance = +14.7%</a:t>
             </a:r>
           </a:p>
           <a:p>
@@ -11905,7 +11909,7 @@
           <a:p>
             <a:r>
               <a:rPr lang="en-US" sz="2400" dirty="0"/>
-              <a:t>Market performance = +14.7</a:t>
+              <a:t>Market performance = +14.7%</a:t>
             </a:r>
           </a:p>
           <a:p>
@@ -13156,6 +13160,544 @@
     <p:extLst>
       <p:ext uri="{BB962C8B-B14F-4D97-AF65-F5344CB8AC3E}">
         <p14:creationId xmlns:p14="http://schemas.microsoft.com/office/powerpoint/2010/main" val="2432380127"/>
+      </p:ext>
+    </p:extLst>
+  </p:cSld>
+  <p:clrMapOvr>
+    <a:masterClrMapping/>
+  </p:clrMapOvr>
+</p:sld>
+</file>
+
+<file path=ppt/slides/slide20.xml><?xml version="1.0" encoding="utf-8"?>
+<p:sld xmlns:a="http://schemas.openxmlformats.org/drawingml/2006/main" xmlns:r="http://schemas.openxmlformats.org/officeDocument/2006/relationships" xmlns:p="http://schemas.openxmlformats.org/presentationml/2006/main">
+  <p:cSld>
+    <p:spTree>
+      <p:nvGrpSpPr>
+        <p:cNvPr id="1" name=""/>
+        <p:cNvGrpSpPr/>
+        <p:nvPr/>
+      </p:nvGrpSpPr>
+      <p:grpSpPr>
+        <a:xfrm>
+          <a:off x="0" y="0"/>
+          <a:ext cx="0" cy="0"/>
+          <a:chOff x="0" y="0"/>
+          <a:chExt cx="0" cy="0"/>
+        </a:xfrm>
+      </p:grpSpPr>
+      <p:sp>
+        <p:nvSpPr>
+          <p:cNvPr id="2" name="Title 1">
+            <a:extLst>
+              <a:ext uri="{FF2B5EF4-FFF2-40B4-BE49-F238E27FC236}">
+                <a16:creationId xmlns:a16="http://schemas.microsoft.com/office/drawing/2014/main" id="{353BBCA6-F437-4359-8C87-ABCF8EF58EA2}"/>
+              </a:ext>
+            </a:extLst>
+          </p:cNvPr>
+          <p:cNvSpPr>
+            <a:spLocks noGrp="1"/>
+          </p:cNvSpPr>
+          <p:nvPr>
+            <p:ph type="title"/>
+          </p:nvPr>
+        </p:nvSpPr>
+        <p:spPr/>
+        <p:txBody>
+          <a:bodyPr/>
+          <a:lstStyle/>
+          <a:p>
+            <a:r>
+              <a:rPr lang="en-US" dirty="0"/>
+              <a:t>Current predictions (as of today)</a:t>
+            </a:r>
+          </a:p>
+        </p:txBody>
+      </p:sp>
+      <p:sp>
+        <p:nvSpPr>
+          <p:cNvPr id="3" name="Content Placeholder 2">
+            <a:extLst>
+              <a:ext uri="{FF2B5EF4-FFF2-40B4-BE49-F238E27FC236}">
+                <a16:creationId xmlns:a16="http://schemas.microsoft.com/office/drawing/2014/main" id="{D8D26700-6700-471B-8DCB-890554533AC1}"/>
+              </a:ext>
+            </a:extLst>
+          </p:cNvPr>
+          <p:cNvSpPr>
+            <a:spLocks noGrp="1"/>
+          </p:cNvSpPr>
+          <p:nvPr>
+            <p:ph idx="1"/>
+          </p:nvPr>
+        </p:nvSpPr>
+        <p:spPr/>
+        <p:txBody>
+          <a:bodyPr/>
+          <a:lstStyle/>
+          <a:p>
+            <a:r>
+              <a:rPr lang="en-US" sz="2800" dirty="0"/>
+              <a:t>Small US Tech Companies:</a:t>
+            </a:r>
+          </a:p>
+          <a:p>
+            <a:endParaRPr lang="en-US" sz="2800" dirty="0"/>
+          </a:p>
+          <a:p>
+            <a:endParaRPr lang="en-US" dirty="0"/>
+          </a:p>
+        </p:txBody>
+      </p:sp>
+      <p:graphicFrame>
+        <p:nvGraphicFramePr>
+          <p:cNvPr id="4" name="Table 4">
+            <a:extLst>
+              <a:ext uri="{FF2B5EF4-FFF2-40B4-BE49-F238E27FC236}">
+                <a16:creationId xmlns:a16="http://schemas.microsoft.com/office/drawing/2014/main" id="{AE858FFD-3F8F-4DE6-A759-4D623C77C319}"/>
+              </a:ext>
+            </a:extLst>
+          </p:cNvPr>
+          <p:cNvGraphicFramePr>
+            <a:graphicFrameLocks noGrp="1"/>
+          </p:cNvGraphicFramePr>
+          <p:nvPr>
+            <p:extLst>
+              <p:ext uri="{D42A27DB-BD31-4B8C-83A1-F6EECF244321}">
+                <p14:modId xmlns:p14="http://schemas.microsoft.com/office/powerpoint/2010/main" val="1422838137"/>
+              </p:ext>
+            </p:extLst>
+          </p:nvPr>
+        </p:nvGraphicFramePr>
+        <p:xfrm>
+          <a:off x="1736579" y="2876126"/>
+          <a:ext cx="8128000" cy="2743200"/>
+        </p:xfrm>
+        <a:graphic>
+          <a:graphicData uri="http://schemas.openxmlformats.org/drawingml/2006/table">
+            <a:tbl>
+              <a:tblPr firstRow="1" bandRow="1">
+                <a:tableStyleId>{5C22544A-7EE6-4342-B048-85BDC9FD1C3A}</a:tableStyleId>
+              </a:tblPr>
+              <a:tblGrid>
+                <a:gridCol w="4064000">
+                  <a:extLst>
+                    <a:ext uri="{9D8B030D-6E8A-4147-A177-3AD203B41FA5}">
+                      <a16:colId xmlns:a16="http://schemas.microsoft.com/office/drawing/2014/main" val="527949157"/>
+                    </a:ext>
+                  </a:extLst>
+                </a:gridCol>
+                <a:gridCol w="4064000">
+                  <a:extLst>
+                    <a:ext uri="{9D8B030D-6E8A-4147-A177-3AD203B41FA5}">
+                      <a16:colId xmlns:a16="http://schemas.microsoft.com/office/drawing/2014/main" val="120814017"/>
+                    </a:ext>
+                  </a:extLst>
+                </a:gridCol>
+              </a:tblGrid>
+              <a:tr h="370840">
+                <a:tc>
+                  <a:txBody>
+                    <a:bodyPr/>
+                    <a:lstStyle/>
+                    <a:p>
+                      <a:r>
+                        <a:rPr lang="en-US" sz="2400" dirty="0"/>
+                        <a:t>Stock ticker</a:t>
+                      </a:r>
+                    </a:p>
+                  </a:txBody>
+                  <a:tcPr/>
+                </a:tc>
+                <a:tc>
+                  <a:txBody>
+                    <a:bodyPr/>
+                    <a:lstStyle/>
+                    <a:p>
+                      <a:r>
+                        <a:rPr lang="en-US" sz="2400" dirty="0"/>
+                        <a:t>Prediction confidence</a:t>
+                      </a:r>
+                    </a:p>
+                  </a:txBody>
+                  <a:tcPr/>
+                </a:tc>
+                <a:extLst>
+                  <a:ext uri="{0D108BD9-81ED-4DB2-BD59-A6C34878D82A}">
+                    <a16:rowId xmlns:a16="http://schemas.microsoft.com/office/drawing/2014/main" val="570923123"/>
+                  </a:ext>
+                </a:extLst>
+              </a:tr>
+              <a:tr h="370840">
+                <a:tc>
+                  <a:txBody>
+                    <a:bodyPr/>
+                    <a:lstStyle/>
+                    <a:p>
+                      <a:r>
+                        <a:rPr lang="en-US" sz="2400" dirty="0"/>
+                        <a:t>SOL</a:t>
+                      </a:r>
+                    </a:p>
+                  </a:txBody>
+                  <a:tcPr/>
+                </a:tc>
+                <a:tc>
+                  <a:txBody>
+                    <a:bodyPr/>
+                    <a:lstStyle/>
+                    <a:p>
+                      <a:r>
+                        <a:rPr lang="en-US" sz="2400" dirty="0"/>
+                        <a:t>0.624</a:t>
+                      </a:r>
+                    </a:p>
+                  </a:txBody>
+                  <a:tcPr/>
+                </a:tc>
+                <a:extLst>
+                  <a:ext uri="{0D108BD9-81ED-4DB2-BD59-A6C34878D82A}">
+                    <a16:rowId xmlns:a16="http://schemas.microsoft.com/office/drawing/2014/main" val="1287208478"/>
+                  </a:ext>
+                </a:extLst>
+              </a:tr>
+              <a:tr h="370840">
+                <a:tc>
+                  <a:txBody>
+                    <a:bodyPr/>
+                    <a:lstStyle/>
+                    <a:p>
+                      <a:r>
+                        <a:rPr lang="en-US" sz="2400" dirty="0"/>
+                        <a:t>PRTH</a:t>
+                      </a:r>
+                    </a:p>
+                  </a:txBody>
+                  <a:tcPr/>
+                </a:tc>
+                <a:tc>
+                  <a:txBody>
+                    <a:bodyPr/>
+                    <a:lstStyle/>
+                    <a:p>
+                      <a:r>
+                        <a:rPr lang="en-US" sz="2400" dirty="0"/>
+                        <a:t>0.616</a:t>
+                      </a:r>
+                    </a:p>
+                  </a:txBody>
+                  <a:tcPr/>
+                </a:tc>
+                <a:extLst>
+                  <a:ext uri="{0D108BD9-81ED-4DB2-BD59-A6C34878D82A}">
+                    <a16:rowId xmlns:a16="http://schemas.microsoft.com/office/drawing/2014/main" val="2778498978"/>
+                  </a:ext>
+                </a:extLst>
+              </a:tr>
+              <a:tr h="370840">
+                <a:tc>
+                  <a:txBody>
+                    <a:bodyPr/>
+                    <a:lstStyle/>
+                    <a:p>
+                      <a:r>
+                        <a:rPr lang="en-US" sz="2400" dirty="0"/>
+                        <a:t>VERI</a:t>
+                      </a:r>
+                    </a:p>
+                  </a:txBody>
+                  <a:tcPr/>
+                </a:tc>
+                <a:tc>
+                  <a:txBody>
+                    <a:bodyPr/>
+                    <a:lstStyle/>
+                    <a:p>
+                      <a:r>
+                        <a:rPr lang="en-US" sz="2400" dirty="0"/>
+                        <a:t>0.613</a:t>
+                      </a:r>
+                    </a:p>
+                  </a:txBody>
+                  <a:tcPr/>
+                </a:tc>
+                <a:extLst>
+                  <a:ext uri="{0D108BD9-81ED-4DB2-BD59-A6C34878D82A}">
+                    <a16:rowId xmlns:a16="http://schemas.microsoft.com/office/drawing/2014/main" val="788664777"/>
+                  </a:ext>
+                </a:extLst>
+              </a:tr>
+              <a:tr h="370840">
+                <a:tc>
+                  <a:txBody>
+                    <a:bodyPr/>
+                    <a:lstStyle/>
+                    <a:p>
+                      <a:r>
+                        <a:rPr lang="en-US" sz="2400" dirty="0"/>
+                        <a:t>MTLS</a:t>
+                      </a:r>
+                    </a:p>
+                  </a:txBody>
+                  <a:tcPr/>
+                </a:tc>
+                <a:tc>
+                  <a:txBody>
+                    <a:bodyPr/>
+                    <a:lstStyle/>
+                    <a:p>
+                      <a:r>
+                        <a:rPr lang="en-US" sz="2400" dirty="0"/>
+                        <a:t>0.573</a:t>
+                      </a:r>
+                    </a:p>
+                  </a:txBody>
+                  <a:tcPr/>
+                </a:tc>
+                <a:extLst>
+                  <a:ext uri="{0D108BD9-81ED-4DB2-BD59-A6C34878D82A}">
+                    <a16:rowId xmlns:a16="http://schemas.microsoft.com/office/drawing/2014/main" val="448388977"/>
+                  </a:ext>
+                </a:extLst>
+              </a:tr>
+              <a:tr h="370840">
+                <a:tc>
+                  <a:txBody>
+                    <a:bodyPr/>
+                    <a:lstStyle/>
+                    <a:p>
+                      <a:r>
+                        <a:rPr lang="en-US" sz="2400" dirty="0"/>
+                        <a:t>ATOM</a:t>
+                      </a:r>
+                    </a:p>
+                  </a:txBody>
+                  <a:tcPr/>
+                </a:tc>
+                <a:tc>
+                  <a:txBody>
+                    <a:bodyPr/>
+                    <a:lstStyle/>
+                    <a:p>
+                      <a:r>
+                        <a:rPr lang="en-US" sz="2400" dirty="0"/>
+                        <a:t>0.564</a:t>
+                      </a:r>
+                    </a:p>
+                  </a:txBody>
+                  <a:tcPr/>
+                </a:tc>
+                <a:extLst>
+                  <a:ext uri="{0D108BD9-81ED-4DB2-BD59-A6C34878D82A}">
+                    <a16:rowId xmlns:a16="http://schemas.microsoft.com/office/drawing/2014/main" val="1415199903"/>
+                  </a:ext>
+                </a:extLst>
+              </a:tr>
+            </a:tbl>
+          </a:graphicData>
+        </a:graphic>
+      </p:graphicFrame>
+    </p:spTree>
+    <p:extLst>
+      <p:ext uri="{BB962C8B-B14F-4D97-AF65-F5344CB8AC3E}">
+        <p14:creationId xmlns:p14="http://schemas.microsoft.com/office/powerpoint/2010/main" val="2981795984"/>
+      </p:ext>
+    </p:extLst>
+  </p:cSld>
+  <p:clrMapOvr>
+    <a:masterClrMapping/>
+  </p:clrMapOvr>
+</p:sld>
+</file>
+
+<file path=ppt/slides/slide21.xml><?xml version="1.0" encoding="utf-8"?>
+<p:sld xmlns:a="http://schemas.openxmlformats.org/drawingml/2006/main" xmlns:r="http://schemas.openxmlformats.org/officeDocument/2006/relationships" xmlns:p="http://schemas.openxmlformats.org/presentationml/2006/main">
+  <p:cSld>
+    <p:spTree>
+      <p:nvGrpSpPr>
+        <p:cNvPr id="1" name=""/>
+        <p:cNvGrpSpPr/>
+        <p:nvPr/>
+      </p:nvGrpSpPr>
+      <p:grpSpPr>
+        <a:xfrm>
+          <a:off x="0" y="0"/>
+          <a:ext cx="0" cy="0"/>
+          <a:chOff x="0" y="0"/>
+          <a:chExt cx="0" cy="0"/>
+        </a:xfrm>
+      </p:grpSpPr>
+      <p:pic>
+        <p:nvPicPr>
+          <p:cNvPr id="3" name="Picture 2" descr="Chart, histogram&#10;&#10;Description automatically generated">
+            <a:extLst>
+              <a:ext uri="{FF2B5EF4-FFF2-40B4-BE49-F238E27FC236}">
+                <a16:creationId xmlns:a16="http://schemas.microsoft.com/office/drawing/2014/main" id="{0631E4C3-948F-4C47-9830-FB57C645A058}"/>
+              </a:ext>
+            </a:extLst>
+          </p:cNvPr>
+          <p:cNvPicPr>
+            <a:picLocks noChangeAspect="1"/>
+          </p:cNvPicPr>
+          <p:nvPr/>
+        </p:nvPicPr>
+        <p:blipFill>
+          <a:blip r:embed="rId2">
+            <a:extLst>
+              <a:ext uri="{28A0092B-C50C-407E-A947-70E740481C1C}">
+                <a14:useLocalDpi xmlns:a14="http://schemas.microsoft.com/office/drawing/2010/main" val="0"/>
+              </a:ext>
+            </a:extLst>
+          </a:blip>
+          <a:stretch>
+            <a:fillRect/>
+          </a:stretch>
+        </p:blipFill>
+        <p:spPr>
+          <a:xfrm>
+            <a:off x="0" y="1049215"/>
+            <a:ext cx="12192000" cy="4759569"/>
+          </a:xfrm>
+          <a:prstGeom prst="rect">
+            <a:avLst/>
+          </a:prstGeom>
+        </p:spPr>
+      </p:pic>
+    </p:spTree>
+    <p:extLst>
+      <p:ext uri="{BB962C8B-B14F-4D97-AF65-F5344CB8AC3E}">
+        <p14:creationId xmlns:p14="http://schemas.microsoft.com/office/powerpoint/2010/main" val="3287630282"/>
+      </p:ext>
+    </p:extLst>
+  </p:cSld>
+  <p:clrMapOvr>
+    <a:masterClrMapping/>
+  </p:clrMapOvr>
+</p:sld>
+</file>
+
+<file path=ppt/slides/slide22.xml><?xml version="1.0" encoding="utf-8"?>
+<p:sld xmlns:a="http://schemas.openxmlformats.org/drawingml/2006/main" xmlns:r="http://schemas.openxmlformats.org/officeDocument/2006/relationships" xmlns:p="http://schemas.openxmlformats.org/presentationml/2006/main">
+  <p:cSld>
+    <p:spTree>
+      <p:nvGrpSpPr>
+        <p:cNvPr id="1" name=""/>
+        <p:cNvGrpSpPr/>
+        <p:nvPr/>
+      </p:nvGrpSpPr>
+      <p:grpSpPr>
+        <a:xfrm>
+          <a:off x="0" y="0"/>
+          <a:ext cx="0" cy="0"/>
+          <a:chOff x="0" y="0"/>
+          <a:chExt cx="0" cy="0"/>
+        </a:xfrm>
+      </p:grpSpPr>
+      <p:pic>
+        <p:nvPicPr>
+          <p:cNvPr id="3" name="Picture 2" descr="Chart&#10;&#10;Description automatically generated">
+            <a:extLst>
+              <a:ext uri="{FF2B5EF4-FFF2-40B4-BE49-F238E27FC236}">
+                <a16:creationId xmlns:a16="http://schemas.microsoft.com/office/drawing/2014/main" id="{83794E41-7DC5-4D72-A742-93D1315AB9F3}"/>
+              </a:ext>
+            </a:extLst>
+          </p:cNvPr>
+          <p:cNvPicPr>
+            <a:picLocks noChangeAspect="1"/>
+          </p:cNvPicPr>
+          <p:nvPr/>
+        </p:nvPicPr>
+        <p:blipFill>
+          <a:blip r:embed="rId2">
+            <a:extLst>
+              <a:ext uri="{28A0092B-C50C-407E-A947-70E740481C1C}">
+                <a14:useLocalDpi xmlns:a14="http://schemas.microsoft.com/office/drawing/2010/main" val="0"/>
+              </a:ext>
+            </a:extLst>
+          </a:blip>
+          <a:stretch>
+            <a:fillRect/>
+          </a:stretch>
+        </p:blipFill>
+        <p:spPr>
+          <a:xfrm>
+            <a:off x="0" y="1271954"/>
+            <a:ext cx="12192000" cy="4314092"/>
+          </a:xfrm>
+          <a:prstGeom prst="rect">
+            <a:avLst/>
+          </a:prstGeom>
+        </p:spPr>
+      </p:pic>
+    </p:spTree>
+    <p:extLst>
+      <p:ext uri="{BB962C8B-B14F-4D97-AF65-F5344CB8AC3E}">
+        <p14:creationId xmlns:p14="http://schemas.microsoft.com/office/powerpoint/2010/main" val="3536289142"/>
+      </p:ext>
+    </p:extLst>
+  </p:cSld>
+  <p:clrMapOvr>
+    <a:masterClrMapping/>
+  </p:clrMapOvr>
+</p:sld>
+</file>
+
+<file path=ppt/slides/slide23.xml><?xml version="1.0" encoding="utf-8"?>
+<p:sld xmlns:a="http://schemas.openxmlformats.org/drawingml/2006/main" xmlns:r="http://schemas.openxmlformats.org/officeDocument/2006/relationships" xmlns:p="http://schemas.openxmlformats.org/presentationml/2006/main">
+  <p:cSld>
+    <p:spTree>
+      <p:nvGrpSpPr>
+        <p:cNvPr id="1" name=""/>
+        <p:cNvGrpSpPr/>
+        <p:nvPr/>
+      </p:nvGrpSpPr>
+      <p:grpSpPr>
+        <a:xfrm>
+          <a:off x="0" y="0"/>
+          <a:ext cx="0" cy="0"/>
+          <a:chOff x="0" y="0"/>
+          <a:chExt cx="0" cy="0"/>
+        </a:xfrm>
+      </p:grpSpPr>
+      <p:pic>
+        <p:nvPicPr>
+          <p:cNvPr id="3" name="Picture 2" descr="Chart, histogram&#10;&#10;Description automatically generated">
+            <a:extLst>
+              <a:ext uri="{FF2B5EF4-FFF2-40B4-BE49-F238E27FC236}">
+                <a16:creationId xmlns:a16="http://schemas.microsoft.com/office/drawing/2014/main" id="{11139447-B694-469E-9E54-3836B283CCEE}"/>
+              </a:ext>
+            </a:extLst>
+          </p:cNvPr>
+          <p:cNvPicPr>
+            <a:picLocks noChangeAspect="1"/>
+          </p:cNvPicPr>
+          <p:nvPr/>
+        </p:nvPicPr>
+        <p:blipFill>
+          <a:blip r:embed="rId2">
+            <a:extLst>
+              <a:ext uri="{28A0092B-C50C-407E-A947-70E740481C1C}">
+                <a14:useLocalDpi xmlns:a14="http://schemas.microsoft.com/office/drawing/2010/main" val="0"/>
+              </a:ext>
+            </a:extLst>
+          </a:blip>
+          <a:stretch>
+            <a:fillRect/>
+          </a:stretch>
+        </p:blipFill>
+        <p:spPr>
+          <a:xfrm>
+            <a:off x="0" y="1049215"/>
+            <a:ext cx="12192000" cy="4759569"/>
+          </a:xfrm>
+          <a:prstGeom prst="rect">
+            <a:avLst/>
+          </a:prstGeom>
+        </p:spPr>
+      </p:pic>
+    </p:spTree>
+    <p:extLst>
+      <p:ext uri="{BB962C8B-B14F-4D97-AF65-F5344CB8AC3E}">
+        <p14:creationId xmlns:p14="http://schemas.microsoft.com/office/powerpoint/2010/main" val="2281256322"/>
       </p:ext>
     </p:extLst>
   </p:cSld>

</xml_diff>